<commit_message>
fixed a lot of typos linked to capitalization
</commit_message>
<xml_diff>
--- a/Figures/workflow/workflow.pptx
+++ b/Figures/workflow/workflow.pptx
@@ -259,7 +259,7 @@
           <a:p>
             <a:fld id="{8BCF4D5A-B8DA-0B42-B122-40B606B4BD95}" type="datetimeFigureOut">
               <a:rPr lang="en-US" smtClean="0"/>
-              <a:t>5/9/19</a:t>
+              <a:t>9/13/19</a:t>
             </a:fld>
             <a:endParaRPr lang="en-US"/>
           </a:p>
@@ -457,7 +457,7 @@
           <a:p>
             <a:fld id="{8BCF4D5A-B8DA-0B42-B122-40B606B4BD95}" type="datetimeFigureOut">
               <a:rPr lang="en-US" smtClean="0"/>
-              <a:t>5/9/19</a:t>
+              <a:t>9/13/19</a:t>
             </a:fld>
             <a:endParaRPr lang="en-US"/>
           </a:p>
@@ -665,7 +665,7 @@
           <a:p>
             <a:fld id="{8BCF4D5A-B8DA-0B42-B122-40B606B4BD95}" type="datetimeFigureOut">
               <a:rPr lang="en-US" smtClean="0"/>
-              <a:t>5/9/19</a:t>
+              <a:t>9/13/19</a:t>
             </a:fld>
             <a:endParaRPr lang="en-US"/>
           </a:p>
@@ -863,7 +863,7 @@
           <a:p>
             <a:fld id="{8BCF4D5A-B8DA-0B42-B122-40B606B4BD95}" type="datetimeFigureOut">
               <a:rPr lang="en-US" smtClean="0"/>
-              <a:t>5/9/19</a:t>
+              <a:t>9/13/19</a:t>
             </a:fld>
             <a:endParaRPr lang="en-US"/>
           </a:p>
@@ -1138,7 +1138,7 @@
           <a:p>
             <a:fld id="{8BCF4D5A-B8DA-0B42-B122-40B606B4BD95}" type="datetimeFigureOut">
               <a:rPr lang="en-US" smtClean="0"/>
-              <a:t>5/9/19</a:t>
+              <a:t>9/13/19</a:t>
             </a:fld>
             <a:endParaRPr lang="en-US"/>
           </a:p>
@@ -1403,7 +1403,7 @@
           <a:p>
             <a:fld id="{8BCF4D5A-B8DA-0B42-B122-40B606B4BD95}" type="datetimeFigureOut">
               <a:rPr lang="en-US" smtClean="0"/>
-              <a:t>5/9/19</a:t>
+              <a:t>9/13/19</a:t>
             </a:fld>
             <a:endParaRPr lang="en-US"/>
           </a:p>
@@ -1815,7 +1815,7 @@
           <a:p>
             <a:fld id="{8BCF4D5A-B8DA-0B42-B122-40B606B4BD95}" type="datetimeFigureOut">
               <a:rPr lang="en-US" smtClean="0"/>
-              <a:t>5/9/19</a:t>
+              <a:t>9/13/19</a:t>
             </a:fld>
             <a:endParaRPr lang="en-US"/>
           </a:p>
@@ -1956,7 +1956,7 @@
           <a:p>
             <a:fld id="{8BCF4D5A-B8DA-0B42-B122-40B606B4BD95}" type="datetimeFigureOut">
               <a:rPr lang="en-US" smtClean="0"/>
-              <a:t>5/9/19</a:t>
+              <a:t>9/13/19</a:t>
             </a:fld>
             <a:endParaRPr lang="en-US"/>
           </a:p>
@@ -2069,7 +2069,7 @@
           <a:p>
             <a:fld id="{8BCF4D5A-B8DA-0B42-B122-40B606B4BD95}" type="datetimeFigureOut">
               <a:rPr lang="en-US" smtClean="0"/>
-              <a:t>5/9/19</a:t>
+              <a:t>9/13/19</a:t>
             </a:fld>
             <a:endParaRPr lang="en-US"/>
           </a:p>
@@ -2380,7 +2380,7 @@
           <a:p>
             <a:fld id="{8BCF4D5A-B8DA-0B42-B122-40B606B4BD95}" type="datetimeFigureOut">
               <a:rPr lang="en-US" smtClean="0"/>
-              <a:t>5/9/19</a:t>
+              <a:t>9/13/19</a:t>
             </a:fld>
             <a:endParaRPr lang="en-US"/>
           </a:p>
@@ -2668,7 +2668,7 @@
           <a:p>
             <a:fld id="{8BCF4D5A-B8DA-0B42-B122-40B606B4BD95}" type="datetimeFigureOut">
               <a:rPr lang="en-US" smtClean="0"/>
-              <a:t>5/9/19</a:t>
+              <a:t>9/13/19</a:t>
             </a:fld>
             <a:endParaRPr lang="en-US"/>
           </a:p>
@@ -2909,7 +2909,7 @@
           <a:p>
             <a:fld id="{8BCF4D5A-B8DA-0B42-B122-40B606B4BD95}" type="datetimeFigureOut">
               <a:rPr lang="en-US" smtClean="0"/>
-              <a:t>5/9/19</a:t>
+              <a:t>9/13/19</a:t>
             </a:fld>
             <a:endParaRPr lang="en-US"/>
           </a:p>
@@ -3340,64 +3340,12 @@
         </p:nvGrpSpPr>
         <p:grpSpPr>
           <a:xfrm>
-            <a:off x="869211" y="843134"/>
-            <a:ext cx="10120842" cy="3315440"/>
-            <a:chOff x="869211" y="843134"/>
-            <a:chExt cx="10120842" cy="3315440"/>
+            <a:off x="3027515" y="906544"/>
+            <a:ext cx="7804042" cy="3166686"/>
+            <a:chOff x="3100667" y="991888"/>
+            <a:chExt cx="7804042" cy="3166686"/>
           </a:xfrm>
         </p:grpSpPr>
-        <p:sp>
-          <p:nvSpPr>
-            <p:cNvPr id="4" name="Rectangle 3">
-              <a:extLst>
-                <a:ext uri="{FF2B5EF4-FFF2-40B4-BE49-F238E27FC236}">
-                  <a16:creationId xmlns:a16="http://schemas.microsoft.com/office/drawing/2014/main" id="{17A63F93-B1C7-7844-AA7D-A00A3A83BEEB}"/>
-                </a:ext>
-              </a:extLst>
-            </p:cNvPr>
-            <p:cNvSpPr/>
-            <p:nvPr/>
-          </p:nvSpPr>
-          <p:spPr>
-            <a:xfrm>
-              <a:off x="869211" y="2448731"/>
-              <a:ext cx="1363851" cy="728421"/>
-            </a:xfrm>
-            <a:prstGeom prst="rect">
-              <a:avLst/>
-            </a:prstGeom>
-            <a:ln w="28575">
-              <a:solidFill>
-                <a:schemeClr val="tx1"/>
-              </a:solidFill>
-            </a:ln>
-          </p:spPr>
-          <p:style>
-            <a:lnRef idx="2">
-              <a:schemeClr val="dk1"/>
-            </a:lnRef>
-            <a:fillRef idx="1">
-              <a:schemeClr val="lt1"/>
-            </a:fillRef>
-            <a:effectRef idx="0">
-              <a:schemeClr val="dk1"/>
-            </a:effectRef>
-            <a:fontRef idx="minor">
-              <a:schemeClr val="dk1"/>
-            </a:fontRef>
-          </p:style>
-          <p:txBody>
-            <a:bodyPr rtlCol="0" anchor="ctr"/>
-            <a:lstStyle/>
-            <a:p>
-              <a:pPr algn="ctr"/>
-              <a:r>
-                <a:rPr lang="en-US" dirty="0"/>
-                <a:t>1-LoadData</a:t>
-              </a:r>
-            </a:p>
-          </p:txBody>
-        </p:sp>
         <p:sp>
           <p:nvSpPr>
             <p:cNvPr id="5" name="Rectangle 4">
@@ -3444,8 +3392,16 @@
             <a:p>
               <a:pPr algn="ctr"/>
               <a:r>
+                <a:rPr lang="en-US" dirty="0" err="1"/>
+                <a:t>LoadData</a:t>
+              </a:r>
+              <a:endParaRPr lang="en-US" dirty="0"/>
+            </a:p>
+            <a:p>
+              <a:pPr algn="ctr"/>
+              <a:r>
                 <a:rPr lang="en-US" dirty="0"/>
-                <a:t>2-filtering</a:t>
+                <a:t>filtering</a:t>
               </a:r>
             </a:p>
           </p:txBody>
@@ -3496,9 +3452,10 @@
             <a:p>
               <a:pPr algn="ctr"/>
               <a:r>
-                <a:rPr lang="en-US" dirty="0"/>
-                <a:t>3-zinb</a:t>
+                <a:rPr lang="en-US" dirty="0" err="1"/>
+                <a:t>zinb</a:t>
               </a:r>
+              <a:endParaRPr lang="en-US" dirty="0"/>
             </a:p>
           </p:txBody>
         </p:sp>
@@ -3549,7 +3506,7 @@
               <a:pPr algn="ctr"/>
               <a:r>
                 <a:rPr lang="en-US" dirty="0"/>
-                <a:t>4-sc3</a:t>
+                <a:t>SC3</a:t>
               </a:r>
             </a:p>
           </p:txBody>
@@ -3601,7 +3558,7 @@
               <a:pPr algn="ctr"/>
               <a:r>
                 <a:rPr lang="en-US" dirty="0"/>
-                <a:t>5-seurat</a:t>
+                <a:t>Seurat</a:t>
               </a:r>
             </a:p>
           </p:txBody>
@@ -3620,7 +3577,7 @@
           </p:nvSpPr>
           <p:spPr>
             <a:xfrm>
-              <a:off x="9513141" y="2448730"/>
+              <a:off x="9427797" y="2939442"/>
               <a:ext cx="1476912" cy="728421"/>
             </a:xfrm>
             <a:prstGeom prst="rect">
@@ -3653,7 +3610,7 @@
               <a:pPr algn="ctr"/>
               <a:r>
                 <a:rPr lang="en-US" dirty="0"/>
-                <a:t>8-ConsCluster</a:t>
+                <a:t>Dune</a:t>
               </a:r>
             </a:p>
           </p:txBody>
@@ -3672,7 +3629,7 @@
           </p:nvSpPr>
           <p:spPr>
             <a:xfrm>
-              <a:off x="7114255" y="843134"/>
+              <a:off x="7114251" y="991888"/>
               <a:ext cx="1363851" cy="728421"/>
             </a:xfrm>
             <a:prstGeom prst="rect">
@@ -3705,53 +3662,11 @@
               <a:pPr algn="ctr"/>
               <a:r>
                 <a:rPr lang="en-US" dirty="0"/>
-                <a:t>6-Monocle</a:t>
+                <a:t>Monocle</a:t>
               </a:r>
             </a:p>
           </p:txBody>
         </p:sp>
-        <p:cxnSp>
-          <p:nvCxnSpPr>
-            <p:cNvPr id="12" name="Straight Arrow Connector 11">
-              <a:extLst>
-                <a:ext uri="{FF2B5EF4-FFF2-40B4-BE49-F238E27FC236}">
-                  <a16:creationId xmlns:a16="http://schemas.microsoft.com/office/drawing/2014/main" id="{9F277E66-DF8F-A04D-9E68-10EFED25E029}"/>
-                </a:ext>
-              </a:extLst>
-            </p:cNvPr>
-            <p:cNvCxnSpPr>
-              <a:stCxn id="4" idx="3"/>
-              <a:endCxn id="5" idx="1"/>
-            </p:cNvCxnSpPr>
-            <p:nvPr/>
-          </p:nvCxnSpPr>
-          <p:spPr>
-            <a:xfrm>
-              <a:off x="2233062" y="2812942"/>
-              <a:ext cx="867605" cy="0"/>
-            </a:xfrm>
-            <a:prstGeom prst="straightConnector1">
-              <a:avLst/>
-            </a:prstGeom>
-            <a:ln w="12700">
-              <a:tailEnd type="triangle"/>
-            </a:ln>
-          </p:spPr>
-          <p:style>
-            <a:lnRef idx="1">
-              <a:schemeClr val="dk1"/>
-            </a:lnRef>
-            <a:fillRef idx="0">
-              <a:schemeClr val="dk1"/>
-            </a:fillRef>
-            <a:effectRef idx="0">
-              <a:schemeClr val="dk1"/>
-            </a:effectRef>
-            <a:fontRef idx="minor">
-              <a:schemeClr val="tx1"/>
-            </a:fontRef>
-          </p:style>
-        </p:cxnSp>
         <p:cxnSp>
           <p:nvCxnSpPr>
             <p:cNvPr id="13" name="Straight Arrow Connector 12">
@@ -3900,7 +3815,7 @@
           <p:spPr>
             <a:xfrm>
               <a:off x="6664943" y="2812941"/>
-              <a:ext cx="2848198" cy="0"/>
+              <a:ext cx="2762854" cy="490712"/>
             </a:xfrm>
             <a:prstGeom prst="straightConnector1">
               <a:avLst/>
@@ -3942,8 +3857,8 @@
           </p:nvCxnSpPr>
           <p:spPr>
             <a:xfrm flipV="1">
-              <a:off x="6664939" y="1207345"/>
-              <a:ext cx="449316" cy="512964"/>
+              <a:off x="6664939" y="1356099"/>
+              <a:ext cx="449312" cy="364210"/>
             </a:xfrm>
             <a:prstGeom prst="straightConnector1">
               <a:avLst/>
@@ -3985,8 +3900,8 @@
           </p:nvCxnSpPr>
           <p:spPr>
             <a:xfrm flipV="1">
-              <a:off x="6664939" y="2812941"/>
-              <a:ext cx="2848202" cy="981423"/>
+              <a:off x="6664939" y="3303653"/>
+              <a:ext cx="2762858" cy="490711"/>
             </a:xfrm>
             <a:prstGeom prst="straightConnector1">
               <a:avLst/>
@@ -4028,8 +3943,8 @@
           </p:nvCxnSpPr>
           <p:spPr>
             <a:xfrm>
-              <a:off x="8478106" y="1207345"/>
-              <a:ext cx="1035035" cy="1605596"/>
+              <a:off x="8478102" y="1356099"/>
+              <a:ext cx="949695" cy="1947554"/>
             </a:xfrm>
             <a:prstGeom prst="straightConnector1">
               <a:avLst/>
@@ -4067,7 +3982,7 @@
           </p:nvSpPr>
           <p:spPr>
             <a:xfrm>
-              <a:off x="7114255" y="1841420"/>
+              <a:off x="7114255" y="1839164"/>
               <a:ext cx="1363851" cy="728421"/>
             </a:xfrm>
             <a:prstGeom prst="rect">
@@ -4100,7 +4015,7 @@
               <a:pPr algn="ctr"/>
               <a:r>
                 <a:rPr lang="en-US" dirty="0"/>
-                <a:t>7-RSEC</a:t>
+                <a:t>(RSEC)</a:t>
               </a:r>
             </a:p>
           </p:txBody>
@@ -4124,7 +4039,7 @@
           <p:spPr>
             <a:xfrm>
               <a:off x="6664939" y="1720309"/>
-              <a:ext cx="449316" cy="485322"/>
+              <a:ext cx="449316" cy="483066"/>
             </a:xfrm>
             <a:prstGeom prst="straightConnector1">
               <a:avLst/>
@@ -4166,8 +4081,8 @@
           </p:nvCxnSpPr>
           <p:spPr>
             <a:xfrm>
-              <a:off x="8478106" y="2205631"/>
-              <a:ext cx="1035035" cy="607310"/>
+              <a:off x="8478106" y="2203375"/>
+              <a:ext cx="949691" cy="1100278"/>
             </a:xfrm>
             <a:prstGeom prst="straightConnector1">
               <a:avLst/>

</xml_diff>

<commit_message>
meta-neighbour for all analyses
</commit_message>
<xml_diff>
--- a/Figures/workflow/workflow.pptx
+++ b/Figures/workflow/workflow.pptx
@@ -8,6 +8,7 @@
     <p:sldId id="256" r:id="rId2"/>
     <p:sldId id="257" r:id="rId3"/>
     <p:sldId id="258" r:id="rId4"/>
+    <p:sldId id="259" r:id="rId5"/>
   </p:sldIdLst>
   <p:sldSz cx="12192000" cy="6858000"/>
   <p:notesSz cx="6858000" cy="9144000"/>
@@ -6710,6 +6711,1563 @@
 </p:sld>
 </file>
 
+<file path=ppt/slides/slide4.xml><?xml version="1.0" encoding="utf-8"?>
+<p:sld xmlns:a="http://schemas.openxmlformats.org/drawingml/2006/main" xmlns:r="http://schemas.openxmlformats.org/officeDocument/2006/relationships" xmlns:p="http://schemas.openxmlformats.org/presentationml/2006/main">
+  <p:cSld>
+    <p:spTree>
+      <p:nvGrpSpPr>
+        <p:cNvPr id="1" name=""/>
+        <p:cNvGrpSpPr/>
+        <p:nvPr/>
+      </p:nvGrpSpPr>
+      <p:grpSpPr>
+        <a:xfrm>
+          <a:off x="0" y="0"/>
+          <a:ext cx="0" cy="0"/>
+          <a:chOff x="0" y="0"/>
+          <a:chExt cx="0" cy="0"/>
+        </a:xfrm>
+      </p:grpSpPr>
+      <p:graphicFrame>
+        <p:nvGraphicFramePr>
+          <p:cNvPr id="4" name="Table 3">
+            <a:extLst>
+              <a:ext uri="{FF2B5EF4-FFF2-40B4-BE49-F238E27FC236}">
+                <a16:creationId xmlns:a16="http://schemas.microsoft.com/office/drawing/2014/main" id="{E3715673-1102-F047-8BA1-4040F29B7D24}"/>
+              </a:ext>
+            </a:extLst>
+          </p:cNvPr>
+          <p:cNvGraphicFramePr>
+            <a:graphicFrameLocks noGrp="1"/>
+          </p:cNvGraphicFramePr>
+          <p:nvPr>
+            <p:extLst>
+              <p:ext uri="{D42A27DB-BD31-4B8C-83A1-F6EECF244321}">
+                <p14:modId xmlns:p14="http://schemas.microsoft.com/office/powerpoint/2010/main" val="3127347183"/>
+              </p:ext>
+            </p:extLst>
+          </p:nvPr>
+        </p:nvGraphicFramePr>
+        <p:xfrm>
+          <a:off x="390144" y="280416"/>
+          <a:ext cx="7720113" cy="6118304"/>
+        </p:xfrm>
+        <a:graphic>
+          <a:graphicData uri="http://schemas.openxmlformats.org/drawingml/2006/table">
+            <a:tbl>
+              <a:tblPr firstRow="1" firstCol="1" bandCol="1">
+                <a:tableStyleId>{9D7B26C5-4107-4FEC-AEDC-1716B250A1EF}</a:tableStyleId>
+              </a:tblPr>
+              <a:tblGrid>
+                <a:gridCol w="2427030">
+                  <a:extLst>
+                    <a:ext uri="{9D8B030D-6E8A-4147-A177-3AD203B41FA5}">
+                      <a16:colId xmlns:a16="http://schemas.microsoft.com/office/drawing/2014/main" val="1215327015"/>
+                    </a:ext>
+                  </a:extLst>
+                </a:gridCol>
+                <a:gridCol w="2104286">
+                  <a:extLst>
+                    <a:ext uri="{9D8B030D-6E8A-4147-A177-3AD203B41FA5}">
+                      <a16:colId xmlns:a16="http://schemas.microsoft.com/office/drawing/2014/main" val="238954983"/>
+                    </a:ext>
+                  </a:extLst>
+                </a:gridCol>
+                <a:gridCol w="2471123">
+                  <a:extLst>
+                    <a:ext uri="{9D8B030D-6E8A-4147-A177-3AD203B41FA5}">
+                      <a16:colId xmlns:a16="http://schemas.microsoft.com/office/drawing/2014/main" val="2513379545"/>
+                    </a:ext>
+                  </a:extLst>
+                </a:gridCol>
+                <a:gridCol w="717674">
+                  <a:extLst>
+                    <a:ext uri="{9D8B030D-6E8A-4147-A177-3AD203B41FA5}">
+                      <a16:colId xmlns:a16="http://schemas.microsoft.com/office/drawing/2014/main" val="2303852026"/>
+                    </a:ext>
+                  </a:extLst>
+                </a:gridCol>
+              </a:tblGrid>
+              <a:tr h="770178">
+                <a:tc>
+                  <a:txBody>
+                    <a:bodyPr/>
+                    <a:lstStyle/>
+                    <a:p>
+                      <a:pPr algn="ctr"/>
+                      <a:r>
+                        <a:rPr lang="en-US" dirty="0"/>
+                        <a:t>Comparisons</a:t>
+                      </a:r>
+                    </a:p>
+                  </a:txBody>
+                  <a:tcPr anchor="ctr">
+                    <a:lnL w="12700" cap="flat" cmpd="sng" algn="ctr">
+                      <a:solidFill>
+                        <a:schemeClr val="tx1"/>
+                      </a:solidFill>
+                      <a:prstDash val="solid"/>
+                      <a:round/>
+                      <a:headEnd type="none" w="med" len="med"/>
+                      <a:tailEnd type="none" w="med" len="med"/>
+                    </a:lnL>
+                    <a:lnR w="12700" cap="flat" cmpd="sng" algn="ctr">
+                      <a:solidFill>
+                        <a:schemeClr val="tx1"/>
+                      </a:solidFill>
+                      <a:prstDash val="solid"/>
+                      <a:round/>
+                      <a:headEnd type="none" w="med" len="med"/>
+                      <a:tailEnd type="none" w="med" len="med"/>
+                    </a:lnR>
+                    <a:lnT w="12700" cap="flat" cmpd="sng" algn="ctr">
+                      <a:solidFill>
+                        <a:schemeClr val="tx1"/>
+                      </a:solidFill>
+                      <a:prstDash val="solid"/>
+                      <a:round/>
+                      <a:headEnd type="none" w="med" len="med"/>
+                      <a:tailEnd type="none" w="med" len="med"/>
+                    </a:lnT>
+                    <a:lnB w="12700" cap="flat" cmpd="sng" algn="ctr">
+                      <a:solidFill>
+                        <a:schemeClr val="tx1"/>
+                      </a:solidFill>
+                      <a:prstDash val="solid"/>
+                      <a:round/>
+                      <a:headEnd type="none" w="med" len="med"/>
+                      <a:tailEnd type="none" w="med" len="med"/>
+                    </a:lnB>
+                    <a:noFill/>
+                  </a:tcPr>
+                </a:tc>
+                <a:tc>
+                  <a:txBody>
+                    <a:bodyPr/>
+                    <a:lstStyle/>
+                    <a:p>
+                      <a:pPr algn="ctr"/>
+                      <a:r>
+                        <a:rPr lang="en-US" dirty="0" err="1"/>
+                        <a:t>singleMethod</a:t>
+                      </a:r>
+                      <a:endParaRPr lang="en-US" dirty="0"/>
+                    </a:p>
+                    <a:p>
+                      <a:pPr algn="ctr"/>
+                      <a:r>
+                        <a:rPr lang="en-US" dirty="0"/>
+                        <a:t>(many parameters)</a:t>
+                      </a:r>
+                    </a:p>
+                  </a:txBody>
+                  <a:tcPr anchor="ctr">
+                    <a:lnL w="12700" cap="flat" cmpd="sng" algn="ctr">
+                      <a:solidFill>
+                        <a:schemeClr val="tx1"/>
+                      </a:solidFill>
+                      <a:prstDash val="solid"/>
+                      <a:round/>
+                      <a:headEnd type="none" w="med" len="med"/>
+                      <a:tailEnd type="none" w="med" len="med"/>
+                    </a:lnL>
+                    <a:lnR w="12700" cap="flat" cmpd="sng" algn="ctr">
+                      <a:solidFill>
+                        <a:schemeClr val="tx1"/>
+                      </a:solidFill>
+                      <a:prstDash val="solid"/>
+                      <a:round/>
+                      <a:headEnd type="none" w="med" len="med"/>
+                      <a:tailEnd type="none" w="med" len="med"/>
+                    </a:lnR>
+                    <a:lnT w="12700" cap="flat" cmpd="sng" algn="ctr">
+                      <a:solidFill>
+                        <a:schemeClr val="tx1"/>
+                      </a:solidFill>
+                      <a:prstDash val="solid"/>
+                      <a:round/>
+                      <a:headEnd type="none" w="med" len="med"/>
+                      <a:tailEnd type="none" w="med" len="med"/>
+                    </a:lnT>
+                    <a:lnB w="12700" cap="flat" cmpd="sng" algn="ctr">
+                      <a:solidFill>
+                        <a:schemeClr val="tx1"/>
+                      </a:solidFill>
+                      <a:prstDash val="solid"/>
+                      <a:round/>
+                      <a:headEnd type="none" w="med" len="med"/>
+                      <a:tailEnd type="none" w="med" len="med"/>
+                    </a:lnB>
+                    <a:noFill/>
+                  </a:tcPr>
+                </a:tc>
+                <a:tc>
+                  <a:txBody>
+                    <a:bodyPr/>
+                    <a:lstStyle/>
+                    <a:p>
+                      <a:pPr marL="0" marR="0" lvl="0" indent="0" algn="ctr" defTabSz="914400" rtl="0" eaLnBrk="1" fontAlgn="auto" latinLnBrk="0" hangingPunct="1">
+                        <a:lnSpc>
+                          <a:spcPct val="100000"/>
+                        </a:lnSpc>
+                        <a:spcBef>
+                          <a:spcPts val="0"/>
+                        </a:spcBef>
+                        <a:spcAft>
+                          <a:spcPts val="0"/>
+                        </a:spcAft>
+                        <a:buClrTx/>
+                        <a:buSzTx/>
+                        <a:buFontTx/>
+                        <a:buNone/>
+                        <a:tabLst/>
+                        <a:defRPr/>
+                      </a:pPr>
+                      <a:r>
+                        <a:rPr lang="en-US" dirty="0" err="1"/>
+                        <a:t>singleTree</a:t>
+                      </a:r>
+                      <a:endParaRPr lang="en-US" dirty="0"/>
+                    </a:p>
+                  </a:txBody>
+                  <a:tcPr anchor="ctr">
+                    <a:lnL w="12700" cap="flat" cmpd="sng" algn="ctr">
+                      <a:solidFill>
+                        <a:schemeClr val="tx1"/>
+                      </a:solidFill>
+                      <a:prstDash val="solid"/>
+                      <a:round/>
+                      <a:headEnd type="none" w="med" len="med"/>
+                      <a:tailEnd type="none" w="med" len="med"/>
+                    </a:lnL>
+                    <a:lnR w="12700" cap="flat" cmpd="sng" algn="ctr">
+                      <a:solidFill>
+                        <a:schemeClr val="tx1"/>
+                      </a:solidFill>
+                      <a:prstDash val="solid"/>
+                      <a:round/>
+                      <a:headEnd type="none" w="med" len="med"/>
+                      <a:tailEnd type="none" w="med" len="med"/>
+                    </a:lnR>
+                    <a:lnT w="12700" cap="flat" cmpd="sng" algn="ctr">
+                      <a:solidFill>
+                        <a:schemeClr val="tx1"/>
+                      </a:solidFill>
+                      <a:prstDash val="solid"/>
+                      <a:round/>
+                      <a:headEnd type="none" w="med" len="med"/>
+                      <a:tailEnd type="none" w="med" len="med"/>
+                    </a:lnT>
+                    <a:lnB w="12700" cap="flat" cmpd="sng" algn="ctr">
+                      <a:solidFill>
+                        <a:schemeClr val="tx1"/>
+                      </a:solidFill>
+                      <a:prstDash val="solid"/>
+                      <a:round/>
+                      <a:headEnd type="none" w="med" len="med"/>
+                      <a:tailEnd type="none" w="med" len="med"/>
+                    </a:lnB>
+                    <a:noFill/>
+                  </a:tcPr>
+                </a:tc>
+                <a:tc>
+                  <a:txBody>
+                    <a:bodyPr/>
+                    <a:lstStyle/>
+                    <a:p>
+                      <a:pPr algn="ctr"/>
+                      <a:r>
+                        <a:rPr lang="en-US" dirty="0"/>
+                        <a:t>Dune</a:t>
+                      </a:r>
+                    </a:p>
+                  </a:txBody>
+                  <a:tcPr anchor="ctr">
+                    <a:lnL w="12700" cap="flat" cmpd="sng" algn="ctr">
+                      <a:solidFill>
+                        <a:schemeClr val="tx1"/>
+                      </a:solidFill>
+                      <a:prstDash val="solid"/>
+                      <a:round/>
+                      <a:headEnd type="none" w="med" len="med"/>
+                      <a:tailEnd type="none" w="med" len="med"/>
+                    </a:lnL>
+                    <a:lnR w="12700" cap="flat" cmpd="sng" algn="ctr">
+                      <a:solidFill>
+                        <a:schemeClr val="tx1"/>
+                      </a:solidFill>
+                      <a:prstDash val="solid"/>
+                      <a:round/>
+                      <a:headEnd type="none" w="med" len="med"/>
+                      <a:tailEnd type="none" w="med" len="med"/>
+                    </a:lnR>
+                    <a:lnT w="12700" cap="flat" cmpd="sng" algn="ctr">
+                      <a:solidFill>
+                        <a:schemeClr val="tx1"/>
+                      </a:solidFill>
+                      <a:prstDash val="solid"/>
+                      <a:round/>
+                      <a:headEnd type="none" w="med" len="med"/>
+                      <a:tailEnd type="none" w="med" len="med"/>
+                    </a:lnT>
+                    <a:lnB w="12700" cap="flat" cmpd="sng" algn="ctr">
+                      <a:solidFill>
+                        <a:schemeClr val="tx1"/>
+                      </a:solidFill>
+                      <a:prstDash val="solid"/>
+                      <a:round/>
+                      <a:headEnd type="none" w="med" len="med"/>
+                      <a:tailEnd type="none" w="med" len="med"/>
+                    </a:lnB>
+                    <a:noFill/>
+                  </a:tcPr>
+                </a:tc>
+                <a:extLst>
+                  <a:ext uri="{0D108BD9-81ED-4DB2-BD59-A6C34878D82A}">
+                    <a16:rowId xmlns:a16="http://schemas.microsoft.com/office/drawing/2014/main" val="3946590031"/>
+                  </a:ext>
+                </a:extLst>
+              </a:tr>
+              <a:tr h="770178">
+                <a:tc>
+                  <a:txBody>
+                    <a:bodyPr/>
+                    <a:lstStyle/>
+                    <a:p>
+                      <a:pPr algn="ctr"/>
+                      <a:r>
+                        <a:rPr lang="en-US" dirty="0"/>
+                        <a:t>10x</a:t>
+                      </a:r>
+                    </a:p>
+                  </a:txBody>
+                  <a:tcPr anchor="ctr">
+                    <a:lnL w="12700" cap="flat" cmpd="sng" algn="ctr">
+                      <a:solidFill>
+                        <a:schemeClr val="tx1"/>
+                      </a:solidFill>
+                      <a:prstDash val="solid"/>
+                      <a:round/>
+                      <a:headEnd type="none" w="med" len="med"/>
+                      <a:tailEnd type="none" w="med" len="med"/>
+                    </a:lnL>
+                    <a:lnR w="12700" cap="flat" cmpd="sng" algn="ctr">
+                      <a:solidFill>
+                        <a:schemeClr val="tx1"/>
+                      </a:solidFill>
+                      <a:prstDash val="solid"/>
+                      <a:round/>
+                      <a:headEnd type="none" w="med" len="med"/>
+                      <a:tailEnd type="none" w="med" len="med"/>
+                    </a:lnR>
+                    <a:lnT w="12700" cap="flat" cmpd="sng" algn="ctr">
+                      <a:solidFill>
+                        <a:schemeClr val="tx1"/>
+                      </a:solidFill>
+                      <a:prstDash val="solid"/>
+                      <a:round/>
+                      <a:headEnd type="none" w="med" len="med"/>
+                      <a:tailEnd type="none" w="med" len="med"/>
+                    </a:lnT>
+                    <a:lnB w="12700" cap="flat" cmpd="sng" algn="ctr">
+                      <a:solidFill>
+                        <a:schemeClr val="tx1"/>
+                      </a:solidFill>
+                      <a:prstDash val="solid"/>
+                      <a:round/>
+                      <a:headEnd type="none" w="med" len="med"/>
+                      <a:tailEnd type="none" w="med" len="med"/>
+                    </a:lnB>
+                    <a:noFill/>
+                  </a:tcPr>
+                </a:tc>
+                <a:tc>
+                  <a:txBody>
+                    <a:bodyPr/>
+                    <a:lstStyle/>
+                    <a:p>
+                      <a:pPr algn="ctr"/>
+                      <a:r>
+                        <a:rPr lang="en-US" dirty="0"/>
+                        <a:t>Seurat</a:t>
+                      </a:r>
+                    </a:p>
+                    <a:p>
+                      <a:pPr algn="ctr"/>
+                      <a:r>
+                        <a:rPr lang="en-US" dirty="0"/>
+                        <a:t>Monocle</a:t>
+                      </a:r>
+                    </a:p>
+                  </a:txBody>
+                  <a:tcPr anchor="ctr">
+                    <a:lnL w="12700" cap="flat" cmpd="sng" algn="ctr">
+                      <a:solidFill>
+                        <a:schemeClr val="tx1"/>
+                      </a:solidFill>
+                      <a:prstDash val="solid"/>
+                      <a:round/>
+                      <a:headEnd type="none" w="med" len="med"/>
+                      <a:tailEnd type="none" w="med" len="med"/>
+                    </a:lnL>
+                    <a:lnR w="12700" cap="flat" cmpd="sng" algn="ctr">
+                      <a:solidFill>
+                        <a:schemeClr val="tx1"/>
+                      </a:solidFill>
+                      <a:prstDash val="solid"/>
+                      <a:round/>
+                      <a:headEnd type="none" w="med" len="med"/>
+                      <a:tailEnd type="none" w="med" len="med"/>
+                    </a:lnR>
+                    <a:lnT w="12700" cap="flat" cmpd="sng" algn="ctr">
+                      <a:solidFill>
+                        <a:schemeClr val="tx1"/>
+                      </a:solidFill>
+                      <a:prstDash val="solid"/>
+                      <a:round/>
+                      <a:headEnd type="none" w="med" len="med"/>
+                      <a:tailEnd type="none" w="med" len="med"/>
+                    </a:lnT>
+                    <a:lnB w="12700" cap="flat" cmpd="sng" algn="ctr">
+                      <a:solidFill>
+                        <a:schemeClr val="tx1"/>
+                      </a:solidFill>
+                      <a:prstDash val="solid"/>
+                      <a:round/>
+                      <a:headEnd type="none" w="med" len="med"/>
+                      <a:tailEnd type="none" w="med" len="med"/>
+                    </a:lnB>
+                    <a:noFill/>
+                  </a:tcPr>
+                </a:tc>
+                <a:tc>
+                  <a:txBody>
+                    <a:bodyPr/>
+                    <a:lstStyle/>
+                    <a:p>
+                      <a:pPr algn="ctr"/>
+                      <a:r>
+                        <a:rPr lang="en-US" dirty="0"/>
+                        <a:t>/</a:t>
+                      </a:r>
+                    </a:p>
+                  </a:txBody>
+                  <a:tcPr anchor="ctr">
+                    <a:lnL w="12700" cap="flat" cmpd="sng" algn="ctr">
+                      <a:solidFill>
+                        <a:schemeClr val="tx1"/>
+                      </a:solidFill>
+                      <a:prstDash val="solid"/>
+                      <a:round/>
+                      <a:headEnd type="none" w="med" len="med"/>
+                      <a:tailEnd type="none" w="med" len="med"/>
+                    </a:lnL>
+                    <a:lnR w="12700" cap="flat" cmpd="sng" algn="ctr">
+                      <a:solidFill>
+                        <a:schemeClr val="tx1"/>
+                      </a:solidFill>
+                      <a:prstDash val="solid"/>
+                      <a:round/>
+                      <a:headEnd type="none" w="med" len="med"/>
+                      <a:tailEnd type="none" w="med" len="med"/>
+                    </a:lnR>
+                    <a:lnT w="12700" cap="flat" cmpd="sng" algn="ctr">
+                      <a:solidFill>
+                        <a:schemeClr val="tx1"/>
+                      </a:solidFill>
+                      <a:prstDash val="solid"/>
+                      <a:round/>
+                      <a:headEnd type="none" w="med" len="med"/>
+                      <a:tailEnd type="none" w="med" len="med"/>
+                    </a:lnT>
+                    <a:lnB w="12700" cap="flat" cmpd="sng" algn="ctr">
+                      <a:solidFill>
+                        <a:schemeClr val="tx1"/>
+                      </a:solidFill>
+                      <a:prstDash val="solid"/>
+                      <a:round/>
+                      <a:headEnd type="none" w="med" len="med"/>
+                      <a:tailEnd type="none" w="med" len="med"/>
+                    </a:lnB>
+                    <a:noFill/>
+                  </a:tcPr>
+                </a:tc>
+                <a:tc>
+                  <a:txBody>
+                    <a:bodyPr/>
+                    <a:lstStyle/>
+                    <a:p>
+                      <a:pPr algn="ctr"/>
+                      <a:r>
+                        <a:rPr lang="en-US" dirty="0"/>
+                        <a:t>.csv</a:t>
+                      </a:r>
+                    </a:p>
+                  </a:txBody>
+                  <a:tcPr anchor="ctr">
+                    <a:lnL w="12700" cap="flat" cmpd="sng" algn="ctr">
+                      <a:solidFill>
+                        <a:schemeClr val="tx1"/>
+                      </a:solidFill>
+                      <a:prstDash val="solid"/>
+                      <a:round/>
+                      <a:headEnd type="none" w="med" len="med"/>
+                      <a:tailEnd type="none" w="med" len="med"/>
+                    </a:lnL>
+                    <a:lnR w="12700" cap="flat" cmpd="sng" algn="ctr">
+                      <a:solidFill>
+                        <a:schemeClr val="tx1"/>
+                      </a:solidFill>
+                      <a:prstDash val="solid"/>
+                      <a:round/>
+                      <a:headEnd type="none" w="med" len="med"/>
+                      <a:tailEnd type="none" w="med" len="med"/>
+                    </a:lnR>
+                    <a:lnT w="12700" cap="flat" cmpd="sng" algn="ctr">
+                      <a:solidFill>
+                        <a:schemeClr val="tx1"/>
+                      </a:solidFill>
+                      <a:prstDash val="solid"/>
+                      <a:round/>
+                      <a:headEnd type="none" w="med" len="med"/>
+                      <a:tailEnd type="none" w="med" len="med"/>
+                    </a:lnT>
+                    <a:lnB w="12700" cap="flat" cmpd="sng" algn="ctr">
+                      <a:solidFill>
+                        <a:schemeClr val="tx1"/>
+                      </a:solidFill>
+                      <a:prstDash val="solid"/>
+                      <a:round/>
+                      <a:headEnd type="none" w="med" len="med"/>
+                      <a:tailEnd type="none" w="med" len="med"/>
+                    </a:lnB>
+                    <a:noFill/>
+                  </a:tcPr>
+                </a:tc>
+                <a:extLst>
+                  <a:ext uri="{0D108BD9-81ED-4DB2-BD59-A6C34878D82A}">
+                    <a16:rowId xmlns:a16="http://schemas.microsoft.com/office/drawing/2014/main" val="1704193524"/>
+                  </a:ext>
+                </a:extLst>
+              </a:tr>
+              <a:tr h="770178">
+                <a:tc>
+                  <a:txBody>
+                    <a:bodyPr/>
+                    <a:lstStyle/>
+                    <a:p>
+                      <a:pPr marL="0" marR="0" lvl="0" indent="0" algn="ctr" defTabSz="914400" rtl="0" eaLnBrk="1" fontAlgn="auto" latinLnBrk="0" hangingPunct="1">
+                        <a:lnSpc>
+                          <a:spcPct val="100000"/>
+                        </a:lnSpc>
+                        <a:spcBef>
+                          <a:spcPts val="0"/>
+                        </a:spcBef>
+                        <a:spcAft>
+                          <a:spcPts val="0"/>
+                        </a:spcAft>
+                        <a:buClrTx/>
+                        <a:buSzTx/>
+                        <a:buFontTx/>
+                        <a:buNone/>
+                        <a:tabLst/>
+                        <a:defRPr/>
+                      </a:pPr>
+                      <a:r>
+                        <a:rPr lang="en-US" dirty="0"/>
+                        <a:t>smart</a:t>
+                      </a:r>
+                    </a:p>
+                  </a:txBody>
+                  <a:tcPr anchor="ctr">
+                    <a:lnL w="12700" cap="flat" cmpd="sng" algn="ctr">
+                      <a:solidFill>
+                        <a:schemeClr val="tx1"/>
+                      </a:solidFill>
+                      <a:prstDash val="solid"/>
+                      <a:round/>
+                      <a:headEnd type="none" w="med" len="med"/>
+                      <a:tailEnd type="none" w="med" len="med"/>
+                    </a:lnL>
+                    <a:lnR w="12700" cap="flat" cmpd="sng" algn="ctr">
+                      <a:solidFill>
+                        <a:schemeClr val="tx1"/>
+                      </a:solidFill>
+                      <a:prstDash val="solid"/>
+                      <a:round/>
+                      <a:headEnd type="none" w="med" len="med"/>
+                      <a:tailEnd type="none" w="med" len="med"/>
+                    </a:lnR>
+                    <a:lnT w="12700" cap="flat" cmpd="sng" algn="ctr">
+                      <a:solidFill>
+                        <a:schemeClr val="tx1"/>
+                      </a:solidFill>
+                      <a:prstDash val="solid"/>
+                      <a:round/>
+                      <a:headEnd type="none" w="med" len="med"/>
+                      <a:tailEnd type="none" w="med" len="med"/>
+                    </a:lnT>
+                    <a:lnB w="12700" cap="flat" cmpd="sng" algn="ctr">
+                      <a:solidFill>
+                        <a:schemeClr val="tx1"/>
+                      </a:solidFill>
+                      <a:prstDash val="solid"/>
+                      <a:round/>
+                      <a:headEnd type="none" w="med" len="med"/>
+                      <a:tailEnd type="none" w="med" len="med"/>
+                    </a:lnB>
+                    <a:noFill/>
+                  </a:tcPr>
+                </a:tc>
+                <a:tc>
+                  <a:txBody>
+                    <a:bodyPr/>
+                    <a:lstStyle/>
+                    <a:p>
+                      <a:pPr algn="ctr"/>
+                      <a:r>
+                        <a:rPr lang="en-US" dirty="0"/>
+                        <a:t>_Seurat</a:t>
+                      </a:r>
+                    </a:p>
+                    <a:p>
+                      <a:pPr algn="ctr"/>
+                      <a:r>
+                        <a:rPr lang="en-US" dirty="0"/>
+                        <a:t>Monocle</a:t>
+                      </a:r>
+                    </a:p>
+                    <a:p>
+                      <a:pPr algn="ctr"/>
+                      <a:r>
+                        <a:rPr lang="en-US" dirty="0"/>
+                        <a:t>SC3</a:t>
+                      </a:r>
+                    </a:p>
+                  </a:txBody>
+                  <a:tcPr anchor="ctr">
+                    <a:lnL w="12700" cap="flat" cmpd="sng" algn="ctr">
+                      <a:solidFill>
+                        <a:schemeClr val="tx1"/>
+                      </a:solidFill>
+                      <a:prstDash val="solid"/>
+                      <a:round/>
+                      <a:headEnd type="none" w="med" len="med"/>
+                      <a:tailEnd type="none" w="med" len="med"/>
+                    </a:lnL>
+                    <a:lnR w="12700" cap="flat" cmpd="sng" algn="ctr">
+                      <a:solidFill>
+                        <a:schemeClr val="tx1"/>
+                      </a:solidFill>
+                      <a:prstDash val="solid"/>
+                      <a:round/>
+                      <a:headEnd type="none" w="med" len="med"/>
+                      <a:tailEnd type="none" w="med" len="med"/>
+                    </a:lnR>
+                    <a:lnT w="12700" cap="flat" cmpd="sng" algn="ctr">
+                      <a:solidFill>
+                        <a:schemeClr val="tx1"/>
+                      </a:solidFill>
+                      <a:prstDash val="solid"/>
+                      <a:round/>
+                      <a:headEnd type="none" w="med" len="med"/>
+                      <a:tailEnd type="none" w="med" len="med"/>
+                    </a:lnT>
+                    <a:lnB w="12700" cap="flat" cmpd="sng" algn="ctr">
+                      <a:solidFill>
+                        <a:schemeClr val="tx1"/>
+                      </a:solidFill>
+                      <a:prstDash val="solid"/>
+                      <a:round/>
+                      <a:headEnd type="none" w="med" len="med"/>
+                      <a:tailEnd type="none" w="med" len="med"/>
+                    </a:lnB>
+                    <a:noFill/>
+                  </a:tcPr>
+                </a:tc>
+                <a:tc>
+                  <a:txBody>
+                    <a:bodyPr/>
+                    <a:lstStyle/>
+                    <a:p>
+                      <a:pPr algn="ctr"/>
+                      <a:r>
+                        <a:rPr lang="en-US" dirty="0"/>
+                        <a:t>/</a:t>
+                      </a:r>
+                    </a:p>
+                  </a:txBody>
+                  <a:tcPr anchor="ctr">
+                    <a:lnL w="12700" cap="flat" cmpd="sng" algn="ctr">
+                      <a:solidFill>
+                        <a:schemeClr val="tx1"/>
+                      </a:solidFill>
+                      <a:prstDash val="solid"/>
+                      <a:round/>
+                      <a:headEnd type="none" w="med" len="med"/>
+                      <a:tailEnd type="none" w="med" len="med"/>
+                    </a:lnL>
+                    <a:lnR w="12700" cap="flat" cmpd="sng" algn="ctr">
+                      <a:solidFill>
+                        <a:schemeClr val="tx1"/>
+                      </a:solidFill>
+                      <a:prstDash val="solid"/>
+                      <a:round/>
+                      <a:headEnd type="none" w="med" len="med"/>
+                      <a:tailEnd type="none" w="med" len="med"/>
+                    </a:lnR>
+                    <a:lnT w="12700" cap="flat" cmpd="sng" algn="ctr">
+                      <a:solidFill>
+                        <a:schemeClr val="tx1"/>
+                      </a:solidFill>
+                      <a:prstDash val="solid"/>
+                      <a:round/>
+                      <a:headEnd type="none" w="med" len="med"/>
+                      <a:tailEnd type="none" w="med" len="med"/>
+                    </a:lnT>
+                    <a:lnB w="12700" cap="flat" cmpd="sng" algn="ctr">
+                      <a:solidFill>
+                        <a:schemeClr val="tx1"/>
+                      </a:solidFill>
+                      <a:prstDash val="solid"/>
+                      <a:round/>
+                      <a:headEnd type="none" w="med" len="med"/>
+                      <a:tailEnd type="none" w="med" len="med"/>
+                    </a:lnB>
+                    <a:noFill/>
+                  </a:tcPr>
+                </a:tc>
+                <a:tc>
+                  <a:txBody>
+                    <a:bodyPr/>
+                    <a:lstStyle/>
+                    <a:p>
+                      <a:pPr algn="ctr"/>
+                      <a:r>
+                        <a:rPr lang="en-US" dirty="0"/>
+                        <a:t>.csv</a:t>
+                      </a:r>
+                    </a:p>
+                  </a:txBody>
+                  <a:tcPr anchor="ctr">
+                    <a:lnL w="12700" cap="flat" cmpd="sng" algn="ctr">
+                      <a:solidFill>
+                        <a:schemeClr val="tx1"/>
+                      </a:solidFill>
+                      <a:prstDash val="solid"/>
+                      <a:round/>
+                      <a:headEnd type="none" w="med" len="med"/>
+                      <a:tailEnd type="none" w="med" len="med"/>
+                    </a:lnL>
+                    <a:lnR w="12700" cap="flat" cmpd="sng" algn="ctr">
+                      <a:solidFill>
+                        <a:schemeClr val="tx1"/>
+                      </a:solidFill>
+                      <a:prstDash val="solid"/>
+                      <a:round/>
+                      <a:headEnd type="none" w="med" len="med"/>
+                      <a:tailEnd type="none" w="med" len="med"/>
+                    </a:lnR>
+                    <a:lnT w="12700" cap="flat" cmpd="sng" algn="ctr">
+                      <a:solidFill>
+                        <a:schemeClr val="tx1"/>
+                      </a:solidFill>
+                      <a:prstDash val="solid"/>
+                      <a:round/>
+                      <a:headEnd type="none" w="med" len="med"/>
+                      <a:tailEnd type="none" w="med" len="med"/>
+                    </a:lnT>
+                    <a:lnB w="12700" cap="flat" cmpd="sng" algn="ctr">
+                      <a:solidFill>
+                        <a:schemeClr val="tx1"/>
+                      </a:solidFill>
+                      <a:prstDash val="solid"/>
+                      <a:round/>
+                      <a:headEnd type="none" w="med" len="med"/>
+                      <a:tailEnd type="none" w="med" len="med"/>
+                    </a:lnB>
+                    <a:noFill/>
+                  </a:tcPr>
+                </a:tc>
+                <a:extLst>
+                  <a:ext uri="{0D108BD9-81ED-4DB2-BD59-A6C34878D82A}">
+                    <a16:rowId xmlns:a16="http://schemas.microsoft.com/office/drawing/2014/main" val="3579986143"/>
+                  </a:ext>
+                </a:extLst>
+              </a:tr>
+              <a:tr h="1100254">
+                <a:tc>
+                  <a:txBody>
+                    <a:bodyPr/>
+                    <a:lstStyle/>
+                    <a:p>
+                      <a:pPr algn="ctr"/>
+                      <a:r>
+                        <a:rPr lang="en-US" dirty="0"/>
+                        <a:t>cells</a:t>
+                      </a:r>
+                    </a:p>
+                  </a:txBody>
+                  <a:tcPr anchor="ctr">
+                    <a:lnL w="12700" cap="flat" cmpd="sng" algn="ctr">
+                      <a:solidFill>
+                        <a:schemeClr val="tx1"/>
+                      </a:solidFill>
+                      <a:prstDash val="solid"/>
+                      <a:round/>
+                      <a:headEnd type="none" w="med" len="med"/>
+                      <a:tailEnd type="none" w="med" len="med"/>
+                    </a:lnL>
+                    <a:lnR w="12700" cap="flat" cmpd="sng" algn="ctr">
+                      <a:solidFill>
+                        <a:schemeClr val="tx1"/>
+                      </a:solidFill>
+                      <a:prstDash val="solid"/>
+                      <a:round/>
+                      <a:headEnd type="none" w="med" len="med"/>
+                      <a:tailEnd type="none" w="med" len="med"/>
+                    </a:lnR>
+                    <a:lnT w="12700" cap="flat" cmpd="sng" algn="ctr">
+                      <a:solidFill>
+                        <a:schemeClr val="tx1"/>
+                      </a:solidFill>
+                      <a:prstDash val="solid"/>
+                      <a:round/>
+                      <a:headEnd type="none" w="med" len="med"/>
+                      <a:tailEnd type="none" w="med" len="med"/>
+                    </a:lnT>
+                    <a:lnB w="12700" cap="flat" cmpd="sng" algn="ctr">
+                      <a:solidFill>
+                        <a:schemeClr val="tx1"/>
+                      </a:solidFill>
+                      <a:prstDash val="solid"/>
+                      <a:round/>
+                      <a:headEnd type="none" w="med" len="med"/>
+                      <a:tailEnd type="none" w="med" len="med"/>
+                    </a:lnB>
+                    <a:noFill/>
+                  </a:tcPr>
+                </a:tc>
+                <a:tc>
+                  <a:txBody>
+                    <a:bodyPr/>
+                    <a:lstStyle/>
+                    <a:p>
+                      <a:pPr algn="ctr"/>
+                      <a:r>
+                        <a:rPr lang="en-US" dirty="0"/>
+                        <a:t>Seurat</a:t>
+                      </a:r>
+                    </a:p>
+                    <a:p>
+                      <a:pPr algn="ctr"/>
+                      <a:r>
+                        <a:rPr lang="en-US" dirty="0"/>
+                        <a:t>Monocle</a:t>
+                      </a:r>
+                    </a:p>
+                  </a:txBody>
+                  <a:tcPr anchor="ctr">
+                    <a:lnL w="12700" cap="flat" cmpd="sng" algn="ctr">
+                      <a:solidFill>
+                        <a:schemeClr val="tx1"/>
+                      </a:solidFill>
+                      <a:prstDash val="solid"/>
+                      <a:round/>
+                      <a:headEnd type="none" w="med" len="med"/>
+                      <a:tailEnd type="none" w="med" len="med"/>
+                    </a:lnL>
+                    <a:lnR w="12700" cap="flat" cmpd="sng" algn="ctr">
+                      <a:solidFill>
+                        <a:schemeClr val="tx1"/>
+                      </a:solidFill>
+                      <a:prstDash val="solid"/>
+                      <a:round/>
+                      <a:headEnd type="none" w="med" len="med"/>
+                      <a:tailEnd type="none" w="med" len="med"/>
+                    </a:lnR>
+                    <a:lnT w="12700" cap="flat" cmpd="sng" algn="ctr">
+                      <a:solidFill>
+                        <a:schemeClr val="tx1"/>
+                      </a:solidFill>
+                      <a:prstDash val="solid"/>
+                      <a:round/>
+                      <a:headEnd type="none" w="med" len="med"/>
+                      <a:tailEnd type="none" w="med" len="med"/>
+                    </a:lnT>
+                    <a:lnB w="12700" cap="flat" cmpd="sng" algn="ctr">
+                      <a:solidFill>
+                        <a:schemeClr val="tx1"/>
+                      </a:solidFill>
+                      <a:prstDash val="solid"/>
+                      <a:round/>
+                      <a:headEnd type="none" w="med" len="med"/>
+                      <a:tailEnd type="none" w="med" len="med"/>
+                    </a:lnB>
+                    <a:noFill/>
+                  </a:tcPr>
+                </a:tc>
+                <a:tc>
+                  <a:txBody>
+                    <a:bodyPr/>
+                    <a:lstStyle/>
+                    <a:p>
+                      <a:pPr algn="ctr"/>
+                      <a:r>
+                        <a:rPr lang="en-US" dirty="0"/>
+                        <a:t>_hierarchical</a:t>
+                      </a:r>
+                    </a:p>
+                    <a:p>
+                      <a:pPr algn="ctr"/>
+                      <a:r>
+                        <a:rPr lang="en-US" dirty="0"/>
+                        <a:t>large2_hierarchical</a:t>
+                      </a:r>
+                    </a:p>
+                    <a:p>
+                      <a:pPr algn="ctr"/>
+                      <a:r>
+                        <a:rPr lang="en-US" b="0" dirty="0"/>
+                        <a:t>_large2_Dune</a:t>
+                      </a:r>
+                    </a:p>
+                    <a:p>
+                      <a:pPr algn="ctr"/>
+                      <a:r>
+                        <a:rPr lang="en-US" dirty="0"/>
+                        <a:t>large3_hierarchical.csv</a:t>
+                      </a:r>
+                    </a:p>
+                    <a:p>
+                      <a:pPr algn="ctr"/>
+                      <a:r>
+                        <a:rPr lang="en-US" dirty="0"/>
+                        <a:t>large3_Dune</a:t>
+                      </a:r>
+                    </a:p>
+                  </a:txBody>
+                  <a:tcPr anchor="ctr">
+                    <a:lnL w="12700" cap="flat" cmpd="sng" algn="ctr">
+                      <a:solidFill>
+                        <a:schemeClr val="tx1"/>
+                      </a:solidFill>
+                      <a:prstDash val="solid"/>
+                      <a:round/>
+                      <a:headEnd type="none" w="med" len="med"/>
+                      <a:tailEnd type="none" w="med" len="med"/>
+                    </a:lnL>
+                    <a:lnR w="12700" cap="flat" cmpd="sng" algn="ctr">
+                      <a:solidFill>
+                        <a:schemeClr val="tx1"/>
+                      </a:solidFill>
+                      <a:prstDash val="solid"/>
+                      <a:round/>
+                      <a:headEnd type="none" w="med" len="med"/>
+                      <a:tailEnd type="none" w="med" len="med"/>
+                    </a:lnR>
+                    <a:lnT w="12700" cap="flat" cmpd="sng" algn="ctr">
+                      <a:solidFill>
+                        <a:schemeClr val="tx1"/>
+                      </a:solidFill>
+                      <a:prstDash val="solid"/>
+                      <a:round/>
+                      <a:headEnd type="none" w="med" len="med"/>
+                      <a:tailEnd type="none" w="med" len="med"/>
+                    </a:lnT>
+                    <a:lnB w="12700" cap="flat" cmpd="sng" algn="ctr">
+                      <a:solidFill>
+                        <a:schemeClr val="tx1"/>
+                      </a:solidFill>
+                      <a:prstDash val="solid"/>
+                      <a:round/>
+                      <a:headEnd type="none" w="med" len="med"/>
+                      <a:tailEnd type="none" w="med" len="med"/>
+                    </a:lnB>
+                    <a:noFill/>
+                  </a:tcPr>
+                </a:tc>
+                <a:tc>
+                  <a:txBody>
+                    <a:bodyPr/>
+                    <a:lstStyle/>
+                    <a:p>
+                      <a:pPr algn="ctr"/>
+                      <a:r>
+                        <a:rPr lang="en-US" dirty="0"/>
+                        <a:t>.csv</a:t>
+                      </a:r>
+                    </a:p>
+                  </a:txBody>
+                  <a:tcPr anchor="ctr">
+                    <a:lnL w="12700" cap="flat" cmpd="sng" algn="ctr">
+                      <a:solidFill>
+                        <a:schemeClr val="tx1"/>
+                      </a:solidFill>
+                      <a:prstDash val="solid"/>
+                      <a:round/>
+                      <a:headEnd type="none" w="med" len="med"/>
+                      <a:tailEnd type="none" w="med" len="med"/>
+                    </a:lnL>
+                    <a:lnR w="12700" cap="flat" cmpd="sng" algn="ctr">
+                      <a:solidFill>
+                        <a:schemeClr val="tx1"/>
+                      </a:solidFill>
+                      <a:prstDash val="solid"/>
+                      <a:round/>
+                      <a:headEnd type="none" w="med" len="med"/>
+                      <a:tailEnd type="none" w="med" len="med"/>
+                    </a:lnR>
+                    <a:lnT w="12700" cap="flat" cmpd="sng" algn="ctr">
+                      <a:solidFill>
+                        <a:schemeClr val="tx1"/>
+                      </a:solidFill>
+                      <a:prstDash val="solid"/>
+                      <a:round/>
+                      <a:headEnd type="none" w="med" len="med"/>
+                      <a:tailEnd type="none" w="med" len="med"/>
+                    </a:lnT>
+                    <a:lnB w="12700" cap="flat" cmpd="sng" algn="ctr">
+                      <a:solidFill>
+                        <a:schemeClr val="tx1"/>
+                      </a:solidFill>
+                      <a:prstDash val="solid"/>
+                      <a:round/>
+                      <a:headEnd type="none" w="med" len="med"/>
+                      <a:tailEnd type="none" w="med" len="med"/>
+                    </a:lnB>
+                    <a:noFill/>
+                  </a:tcPr>
+                </a:tc>
+                <a:extLst>
+                  <a:ext uri="{0D108BD9-81ED-4DB2-BD59-A6C34878D82A}">
+                    <a16:rowId xmlns:a16="http://schemas.microsoft.com/office/drawing/2014/main" val="1519047333"/>
+                  </a:ext>
+                </a:extLst>
+              </a:tr>
+              <a:tr h="1100254">
+                <a:tc>
+                  <a:txBody>
+                    <a:bodyPr/>
+                    <a:lstStyle/>
+                    <a:p>
+                      <a:pPr marL="0" marR="0" lvl="0" indent="0" algn="ctr" defTabSz="914400" rtl="0" eaLnBrk="1" fontAlgn="auto" latinLnBrk="0" hangingPunct="1">
+                        <a:lnSpc>
+                          <a:spcPct val="100000"/>
+                        </a:lnSpc>
+                        <a:spcBef>
+                          <a:spcPts val="0"/>
+                        </a:spcBef>
+                        <a:spcAft>
+                          <a:spcPts val="0"/>
+                        </a:spcAft>
+                        <a:buClrTx/>
+                        <a:buSzTx/>
+                        <a:buFontTx/>
+                        <a:buNone/>
+                        <a:tabLst/>
+                        <a:defRPr/>
+                      </a:pPr>
+                      <a:r>
+                        <a:rPr lang="en-US" dirty="0"/>
+                        <a:t>nuclei</a:t>
+                      </a:r>
+                    </a:p>
+                  </a:txBody>
+                  <a:tcPr anchor="ctr">
+                    <a:lnL w="12700" cap="flat" cmpd="sng" algn="ctr">
+                      <a:solidFill>
+                        <a:schemeClr val="tx1"/>
+                      </a:solidFill>
+                      <a:prstDash val="solid"/>
+                      <a:round/>
+                      <a:headEnd type="none" w="med" len="med"/>
+                      <a:tailEnd type="none" w="med" len="med"/>
+                    </a:lnL>
+                    <a:lnR w="12700" cap="flat" cmpd="sng" algn="ctr">
+                      <a:solidFill>
+                        <a:schemeClr val="tx1"/>
+                      </a:solidFill>
+                      <a:prstDash val="solid"/>
+                      <a:round/>
+                      <a:headEnd type="none" w="med" len="med"/>
+                      <a:tailEnd type="none" w="med" len="med"/>
+                    </a:lnR>
+                    <a:lnT w="12700" cap="flat" cmpd="sng" algn="ctr">
+                      <a:solidFill>
+                        <a:schemeClr val="tx1"/>
+                      </a:solidFill>
+                      <a:prstDash val="solid"/>
+                      <a:round/>
+                      <a:headEnd type="none" w="med" len="med"/>
+                      <a:tailEnd type="none" w="med" len="med"/>
+                    </a:lnT>
+                    <a:lnB w="12700" cap="flat" cmpd="sng" algn="ctr">
+                      <a:solidFill>
+                        <a:schemeClr val="tx1"/>
+                      </a:solidFill>
+                      <a:prstDash val="solid"/>
+                      <a:round/>
+                      <a:headEnd type="none" w="med" len="med"/>
+                      <a:tailEnd type="none" w="med" len="med"/>
+                    </a:lnB>
+                    <a:noFill/>
+                  </a:tcPr>
+                </a:tc>
+                <a:tc>
+                  <a:txBody>
+                    <a:bodyPr/>
+                    <a:lstStyle/>
+                    <a:p>
+                      <a:pPr algn="ctr"/>
+                      <a:r>
+                        <a:rPr lang="en-US" dirty="0"/>
+                        <a:t>Seurat</a:t>
+                      </a:r>
+                    </a:p>
+                    <a:p>
+                      <a:pPr algn="ctr"/>
+                      <a:r>
+                        <a:rPr lang="en-US" dirty="0"/>
+                        <a:t>Monocle</a:t>
+                      </a:r>
+                    </a:p>
+                  </a:txBody>
+                  <a:tcPr anchor="ctr">
+                    <a:lnL w="12700" cap="flat" cmpd="sng" algn="ctr">
+                      <a:solidFill>
+                        <a:schemeClr val="tx1"/>
+                      </a:solidFill>
+                      <a:prstDash val="solid"/>
+                      <a:round/>
+                      <a:headEnd type="none" w="med" len="med"/>
+                      <a:tailEnd type="none" w="med" len="med"/>
+                    </a:lnL>
+                    <a:lnR w="12700" cap="flat" cmpd="sng" algn="ctr">
+                      <a:solidFill>
+                        <a:schemeClr val="tx1"/>
+                      </a:solidFill>
+                      <a:prstDash val="solid"/>
+                      <a:round/>
+                      <a:headEnd type="none" w="med" len="med"/>
+                      <a:tailEnd type="none" w="med" len="med"/>
+                    </a:lnR>
+                    <a:lnT w="12700" cap="flat" cmpd="sng" algn="ctr">
+                      <a:solidFill>
+                        <a:schemeClr val="tx1"/>
+                      </a:solidFill>
+                      <a:prstDash val="solid"/>
+                      <a:round/>
+                      <a:headEnd type="none" w="med" len="med"/>
+                      <a:tailEnd type="none" w="med" len="med"/>
+                    </a:lnT>
+                    <a:lnB w="12700" cap="flat" cmpd="sng" algn="ctr">
+                      <a:solidFill>
+                        <a:schemeClr val="tx1"/>
+                      </a:solidFill>
+                      <a:prstDash val="solid"/>
+                      <a:round/>
+                      <a:headEnd type="none" w="med" len="med"/>
+                      <a:tailEnd type="none" w="med" len="med"/>
+                    </a:lnB>
+                    <a:noFill/>
+                  </a:tcPr>
+                </a:tc>
+                <a:tc>
+                  <a:txBody>
+                    <a:bodyPr/>
+                    <a:lstStyle/>
+                    <a:p>
+                      <a:pPr algn="ctr"/>
+                      <a:r>
+                        <a:rPr lang="en-US" dirty="0"/>
+                        <a:t>/</a:t>
+                      </a:r>
+                    </a:p>
+                  </a:txBody>
+                  <a:tcPr anchor="ctr">
+                    <a:lnL w="12700" cap="flat" cmpd="sng" algn="ctr">
+                      <a:solidFill>
+                        <a:schemeClr val="tx1"/>
+                      </a:solidFill>
+                      <a:prstDash val="solid"/>
+                      <a:round/>
+                      <a:headEnd type="none" w="med" len="med"/>
+                      <a:tailEnd type="none" w="med" len="med"/>
+                    </a:lnL>
+                    <a:lnR w="12700" cap="flat" cmpd="sng" algn="ctr">
+                      <a:solidFill>
+                        <a:schemeClr val="tx1"/>
+                      </a:solidFill>
+                      <a:prstDash val="solid"/>
+                      <a:round/>
+                      <a:headEnd type="none" w="med" len="med"/>
+                      <a:tailEnd type="none" w="med" len="med"/>
+                    </a:lnR>
+                    <a:lnT w="12700" cap="flat" cmpd="sng" algn="ctr">
+                      <a:solidFill>
+                        <a:schemeClr val="tx1"/>
+                      </a:solidFill>
+                      <a:prstDash val="solid"/>
+                      <a:round/>
+                      <a:headEnd type="none" w="med" len="med"/>
+                      <a:tailEnd type="none" w="med" len="med"/>
+                    </a:lnT>
+                    <a:lnB w="12700" cap="flat" cmpd="sng" algn="ctr">
+                      <a:solidFill>
+                        <a:schemeClr val="tx1"/>
+                      </a:solidFill>
+                      <a:prstDash val="solid"/>
+                      <a:round/>
+                      <a:headEnd type="none" w="med" len="med"/>
+                      <a:tailEnd type="none" w="med" len="med"/>
+                    </a:lnB>
+                    <a:noFill/>
+                  </a:tcPr>
+                </a:tc>
+                <a:tc>
+                  <a:txBody>
+                    <a:bodyPr/>
+                    <a:lstStyle/>
+                    <a:p>
+                      <a:pPr algn="ctr"/>
+                      <a:r>
+                        <a:rPr lang="en-US" dirty="0"/>
+                        <a:t>.csv</a:t>
+                      </a:r>
+                    </a:p>
+                  </a:txBody>
+                  <a:tcPr anchor="ctr">
+                    <a:lnL w="12700" cap="flat" cmpd="sng" algn="ctr">
+                      <a:solidFill>
+                        <a:schemeClr val="tx1"/>
+                      </a:solidFill>
+                      <a:prstDash val="solid"/>
+                      <a:round/>
+                      <a:headEnd type="none" w="med" len="med"/>
+                      <a:tailEnd type="none" w="med" len="med"/>
+                    </a:lnL>
+                    <a:lnR w="12700" cap="flat" cmpd="sng" algn="ctr">
+                      <a:solidFill>
+                        <a:schemeClr val="tx1"/>
+                      </a:solidFill>
+                      <a:prstDash val="solid"/>
+                      <a:round/>
+                      <a:headEnd type="none" w="med" len="med"/>
+                      <a:tailEnd type="none" w="med" len="med"/>
+                    </a:lnR>
+                    <a:lnT w="12700" cap="flat" cmpd="sng" algn="ctr">
+                      <a:solidFill>
+                        <a:schemeClr val="tx1"/>
+                      </a:solidFill>
+                      <a:prstDash val="solid"/>
+                      <a:round/>
+                      <a:headEnd type="none" w="med" len="med"/>
+                      <a:tailEnd type="none" w="med" len="med"/>
+                    </a:lnT>
+                    <a:lnB w="12700" cap="flat" cmpd="sng" algn="ctr">
+                      <a:solidFill>
+                        <a:schemeClr val="tx1"/>
+                      </a:solidFill>
+                      <a:prstDash val="solid"/>
+                      <a:round/>
+                      <a:headEnd type="none" w="med" len="med"/>
+                      <a:tailEnd type="none" w="med" len="med"/>
+                    </a:lnB>
+                    <a:noFill/>
+                  </a:tcPr>
+                </a:tc>
+                <a:extLst>
+                  <a:ext uri="{0D108BD9-81ED-4DB2-BD59-A6C34878D82A}">
+                    <a16:rowId xmlns:a16="http://schemas.microsoft.com/office/drawing/2014/main" val="229623635"/>
+                  </a:ext>
+                </a:extLst>
+              </a:tr>
+              <a:tr h="1100254">
+                <a:tc>
+                  <a:txBody>
+                    <a:bodyPr/>
+                    <a:lstStyle/>
+                    <a:p>
+                      <a:pPr marL="0" marR="0" lvl="0" indent="0" algn="ctr" defTabSz="914400" rtl="0" eaLnBrk="1" fontAlgn="auto" latinLnBrk="0" hangingPunct="1">
+                        <a:lnSpc>
+                          <a:spcPct val="100000"/>
+                        </a:lnSpc>
+                        <a:spcBef>
+                          <a:spcPts val="0"/>
+                        </a:spcBef>
+                        <a:spcAft>
+                          <a:spcPts val="0"/>
+                        </a:spcAft>
+                        <a:buClrTx/>
+                        <a:buSzTx/>
+                        <a:buFontTx/>
+                        <a:buNone/>
+                        <a:tabLst/>
+                        <a:defRPr/>
+                      </a:pPr>
+                      <a:r>
+                        <a:rPr lang="en-US" dirty="0"/>
+                        <a:t>smart-</a:t>
+                      </a:r>
+                      <a:r>
+                        <a:rPr lang="en-US" dirty="0" err="1"/>
+                        <a:t>tenx</a:t>
+                      </a:r>
+                      <a:endParaRPr lang="en-US" dirty="0"/>
+                    </a:p>
+                  </a:txBody>
+                  <a:tcPr anchor="ctr">
+                    <a:lnL w="12700" cap="flat" cmpd="sng" algn="ctr">
+                      <a:solidFill>
+                        <a:schemeClr val="tx1"/>
+                      </a:solidFill>
+                      <a:prstDash val="solid"/>
+                      <a:round/>
+                      <a:headEnd type="none" w="med" len="med"/>
+                      <a:tailEnd type="none" w="med" len="med"/>
+                    </a:lnL>
+                    <a:lnR w="12700" cap="flat" cmpd="sng" algn="ctr">
+                      <a:solidFill>
+                        <a:schemeClr val="tx1"/>
+                      </a:solidFill>
+                      <a:prstDash val="solid"/>
+                      <a:round/>
+                      <a:headEnd type="none" w="med" len="med"/>
+                      <a:tailEnd type="none" w="med" len="med"/>
+                    </a:lnR>
+                    <a:lnT w="12700" cap="flat" cmpd="sng" algn="ctr">
+                      <a:solidFill>
+                        <a:schemeClr val="tx1"/>
+                      </a:solidFill>
+                      <a:prstDash val="solid"/>
+                      <a:round/>
+                      <a:headEnd type="none" w="med" len="med"/>
+                      <a:tailEnd type="none" w="med" len="med"/>
+                    </a:lnT>
+                    <a:lnB w="12700" cap="flat" cmpd="sng" algn="ctr">
+                      <a:solidFill>
+                        <a:schemeClr val="tx1"/>
+                      </a:solidFill>
+                      <a:prstDash val="solid"/>
+                      <a:round/>
+                      <a:headEnd type="none" w="med" len="med"/>
+                      <a:tailEnd type="none" w="med" len="med"/>
+                    </a:lnB>
+                    <a:noFill/>
+                  </a:tcPr>
+                </a:tc>
+                <a:tc>
+                  <a:txBody>
+                    <a:bodyPr/>
+                    <a:lstStyle/>
+                    <a:p>
+                      <a:pPr algn="ctr"/>
+                      <a:r>
+                        <a:rPr lang="en-US" dirty="0"/>
+                        <a:t>Seurat</a:t>
+                      </a:r>
+                    </a:p>
+                    <a:p>
+                      <a:pPr algn="ctr"/>
+                      <a:r>
+                        <a:rPr lang="en-US" dirty="0"/>
+                        <a:t>Monocle</a:t>
+                      </a:r>
+                    </a:p>
+                    <a:p>
+                      <a:pPr algn="ctr"/>
+                      <a:endParaRPr lang="en-US" dirty="0"/>
+                    </a:p>
+                  </a:txBody>
+                  <a:tcPr anchor="ctr">
+                    <a:lnL w="12700" cap="flat" cmpd="sng" algn="ctr">
+                      <a:solidFill>
+                        <a:schemeClr val="tx1"/>
+                      </a:solidFill>
+                      <a:prstDash val="solid"/>
+                      <a:round/>
+                      <a:headEnd type="none" w="med" len="med"/>
+                      <a:tailEnd type="none" w="med" len="med"/>
+                    </a:lnL>
+                    <a:lnR w="12700" cap="flat" cmpd="sng" algn="ctr">
+                      <a:solidFill>
+                        <a:schemeClr val="tx1"/>
+                      </a:solidFill>
+                      <a:prstDash val="solid"/>
+                      <a:round/>
+                      <a:headEnd type="none" w="med" len="med"/>
+                      <a:tailEnd type="none" w="med" len="med"/>
+                    </a:lnR>
+                    <a:lnT w="12700" cap="flat" cmpd="sng" algn="ctr">
+                      <a:solidFill>
+                        <a:schemeClr val="tx1"/>
+                      </a:solidFill>
+                      <a:prstDash val="solid"/>
+                      <a:round/>
+                      <a:headEnd type="none" w="med" len="med"/>
+                      <a:tailEnd type="none" w="med" len="med"/>
+                    </a:lnT>
+                    <a:lnB w="12700" cap="flat" cmpd="sng" algn="ctr">
+                      <a:solidFill>
+                        <a:schemeClr val="tx1"/>
+                      </a:solidFill>
+                      <a:prstDash val="solid"/>
+                      <a:round/>
+                      <a:headEnd type="none" w="med" len="med"/>
+                      <a:tailEnd type="none" w="med" len="med"/>
+                    </a:lnB>
+                    <a:noFill/>
+                  </a:tcPr>
+                </a:tc>
+                <a:tc>
+                  <a:txBody>
+                    <a:bodyPr/>
+                    <a:lstStyle/>
+                    <a:p>
+                      <a:pPr algn="ctr"/>
+                      <a:r>
+                        <a:rPr lang="en-US"/>
+                        <a:t>/</a:t>
+                      </a:r>
+                      <a:endParaRPr lang="en-US" dirty="0"/>
+                    </a:p>
+                  </a:txBody>
+                  <a:tcPr anchor="ctr">
+                    <a:lnL w="12700" cap="flat" cmpd="sng" algn="ctr">
+                      <a:solidFill>
+                        <a:schemeClr val="tx1"/>
+                      </a:solidFill>
+                      <a:prstDash val="solid"/>
+                      <a:round/>
+                      <a:headEnd type="none" w="med" len="med"/>
+                      <a:tailEnd type="none" w="med" len="med"/>
+                    </a:lnL>
+                    <a:lnR w="12700" cap="flat" cmpd="sng" algn="ctr">
+                      <a:solidFill>
+                        <a:schemeClr val="tx1"/>
+                      </a:solidFill>
+                      <a:prstDash val="solid"/>
+                      <a:round/>
+                      <a:headEnd type="none" w="med" len="med"/>
+                      <a:tailEnd type="none" w="med" len="med"/>
+                    </a:lnR>
+                    <a:lnT w="12700" cap="flat" cmpd="sng" algn="ctr">
+                      <a:solidFill>
+                        <a:schemeClr val="tx1"/>
+                      </a:solidFill>
+                      <a:prstDash val="solid"/>
+                      <a:round/>
+                      <a:headEnd type="none" w="med" len="med"/>
+                      <a:tailEnd type="none" w="med" len="med"/>
+                    </a:lnT>
+                    <a:lnB w="12700" cap="flat" cmpd="sng" algn="ctr">
+                      <a:solidFill>
+                        <a:schemeClr val="tx1"/>
+                      </a:solidFill>
+                      <a:prstDash val="solid"/>
+                      <a:round/>
+                      <a:headEnd type="none" w="med" len="med"/>
+                      <a:tailEnd type="none" w="med" len="med"/>
+                    </a:lnB>
+                    <a:noFill/>
+                  </a:tcPr>
+                </a:tc>
+                <a:tc>
+                  <a:txBody>
+                    <a:bodyPr/>
+                    <a:lstStyle/>
+                    <a:p>
+                      <a:pPr marL="0" marR="0" lvl="0" indent="0" algn="ctr" defTabSz="914400" rtl="0" eaLnBrk="1" fontAlgn="auto" latinLnBrk="0" hangingPunct="1">
+                        <a:lnSpc>
+                          <a:spcPct val="100000"/>
+                        </a:lnSpc>
+                        <a:spcBef>
+                          <a:spcPts val="0"/>
+                        </a:spcBef>
+                        <a:spcAft>
+                          <a:spcPts val="0"/>
+                        </a:spcAft>
+                        <a:buClrTx/>
+                        <a:buSzTx/>
+                        <a:buFontTx/>
+                        <a:buNone/>
+                        <a:tabLst/>
+                        <a:defRPr/>
+                      </a:pPr>
+                      <a:r>
+                        <a:rPr lang="en-US" dirty="0"/>
+                        <a:t>.csv</a:t>
+                      </a:r>
+                    </a:p>
+                    <a:p>
+                      <a:pPr algn="ctr"/>
+                      <a:endParaRPr lang="en-US" dirty="0"/>
+                    </a:p>
+                  </a:txBody>
+                  <a:tcPr anchor="ctr">
+                    <a:lnL w="12700" cap="flat" cmpd="sng" algn="ctr">
+                      <a:solidFill>
+                        <a:schemeClr val="tx1"/>
+                      </a:solidFill>
+                      <a:prstDash val="solid"/>
+                      <a:round/>
+                      <a:headEnd type="none" w="med" len="med"/>
+                      <a:tailEnd type="none" w="med" len="med"/>
+                    </a:lnL>
+                    <a:lnR w="12700" cap="flat" cmpd="sng" algn="ctr">
+                      <a:solidFill>
+                        <a:schemeClr val="tx1"/>
+                      </a:solidFill>
+                      <a:prstDash val="solid"/>
+                      <a:round/>
+                      <a:headEnd type="none" w="med" len="med"/>
+                      <a:tailEnd type="none" w="med" len="med"/>
+                    </a:lnR>
+                    <a:lnT w="12700" cap="flat" cmpd="sng" algn="ctr">
+                      <a:solidFill>
+                        <a:schemeClr val="tx1"/>
+                      </a:solidFill>
+                      <a:prstDash val="solid"/>
+                      <a:round/>
+                      <a:headEnd type="none" w="med" len="med"/>
+                      <a:tailEnd type="none" w="med" len="med"/>
+                    </a:lnT>
+                    <a:lnB w="12700" cap="flat" cmpd="sng" algn="ctr">
+                      <a:solidFill>
+                        <a:schemeClr val="tx1"/>
+                      </a:solidFill>
+                      <a:prstDash val="solid"/>
+                      <a:round/>
+                      <a:headEnd type="none" w="med" len="med"/>
+                      <a:tailEnd type="none" w="med" len="med"/>
+                    </a:lnB>
+                    <a:noFill/>
+                  </a:tcPr>
+                </a:tc>
+                <a:extLst>
+                  <a:ext uri="{0D108BD9-81ED-4DB2-BD59-A6C34878D82A}">
+                    <a16:rowId xmlns:a16="http://schemas.microsoft.com/office/drawing/2014/main" val="752964432"/>
+                  </a:ext>
+                </a:extLst>
+              </a:tr>
+            </a:tbl>
+          </a:graphicData>
+        </a:graphic>
+      </p:graphicFrame>
+    </p:spTree>
+    <p:extLst>
+      <p:ext uri="{BB962C8B-B14F-4D97-AF65-F5344CB8AC3E}">
+        <p14:creationId xmlns:p14="http://schemas.microsoft.com/office/powerpoint/2010/main" val="4270287913"/>
+      </p:ext>
+    </p:extLst>
+  </p:cSld>
+  <p:clrMapOvr>
+    <a:masterClrMapping/>
+  </p:clrMapOvr>
+</p:sld>
+</file>
+
 <file path=ppt/theme/theme1.xml><?xml version="1.0" encoding="utf-8"?>
 <a:theme xmlns:a="http://schemas.openxmlformats.org/drawingml/2006/main" name="Office Theme">
   <a:themeElements>

</xml_diff>